<commit_message>
Update title slide, module and section numbers.
</commit_message>
<xml_diff>
--- a/LectureFiles/cshl/2015/RNASeq_Module1_Tutorial.pptx
+++ b/LectureFiles/cshl/2015/RNASeq_Module1_Tutorial.pptx
@@ -5455,12 +5455,28 @@
           <a:p>
             <a:pPr eaLnBrk="1" hangingPunct="1"/>
             <a:r>
+              <a:rPr lang="en-US" altLang="ko-KR" dirty="0">
+                <a:latin typeface="Calibri" charset="0"/>
+                <a:ea typeface="ＭＳ Ｐゴシック" charset="0"/>
+                <a:cs typeface="ＭＳ Ｐゴシック" charset="0"/>
+              </a:rPr>
+              <a:t>1</a:t>
+            </a:r>
+            <a:r>
               <a:rPr lang="en-US" altLang="ko-KR" dirty="0" smtClean="0">
                 <a:latin typeface="Calibri" charset="0"/>
                 <a:ea typeface="ＭＳ Ｐゴシック" charset="0"/>
                 <a:cs typeface="ＭＳ Ｐゴシック" charset="0"/>
               </a:rPr>
-              <a:t>2-v. Obtain </a:t>
+              <a:t>-</a:t>
+            </a:r>
+            <a:r>
+              <a:rPr lang="en-US" altLang="ko-KR" dirty="0" smtClean="0">
+                <a:latin typeface="Calibri" charset="0"/>
+                <a:ea typeface="ＭＳ Ｐゴシック" charset="0"/>
+                <a:cs typeface="ＭＳ Ｐゴシック" charset="0"/>
+              </a:rPr>
+              <a:t>v. Obtain </a:t>
             </a:r>
             <a:r>
               <a:rPr lang="en-US" altLang="ko-KR" dirty="0">
@@ -5830,12 +5846,28 @@
           <a:p>
             <a:pPr eaLnBrk="1" hangingPunct="1"/>
             <a:r>
+              <a:rPr lang="en-US" altLang="ko-KR" dirty="0">
+                <a:latin typeface="Calibri" charset="0"/>
+                <a:ea typeface="ＭＳ Ｐゴシック" charset="0"/>
+                <a:cs typeface="ＭＳ Ｐゴシック" charset="0"/>
+              </a:rPr>
+              <a:t>1</a:t>
+            </a:r>
+            <a:r>
               <a:rPr lang="en-US" altLang="ko-KR" dirty="0" smtClean="0">
                 <a:latin typeface="Calibri" charset="0"/>
                 <a:ea typeface="ＭＳ Ｐゴシック" charset="0"/>
                 <a:cs typeface="ＭＳ Ｐゴシック" charset="0"/>
               </a:rPr>
-              <a:t>2-v. </a:t>
+              <a:t>-</a:t>
+            </a:r>
+            <a:r>
+              <a:rPr lang="en-US" altLang="ko-KR" dirty="0" smtClean="0">
+                <a:latin typeface="Calibri" charset="0"/>
+                <a:ea typeface="ＭＳ Ｐゴシック" charset="0"/>
+                <a:cs typeface="ＭＳ Ｐゴシック" charset="0"/>
+              </a:rPr>
+              <a:t>v. </a:t>
             </a:r>
             <a:r>
               <a:rPr lang="en-US" altLang="ko-KR" dirty="0">
@@ -6351,11 +6383,25 @@
           <a:lstStyle/>
           <a:p>
             <a:r>
+              <a:rPr lang="en-US" dirty="0">
+                <a:latin typeface="Calibri" charset="0"/>
+                <a:ea typeface="ＭＳ Ｐゴシック" charset="0"/>
+              </a:rPr>
+              <a:t>1</a:t>
+            </a:r>
+            <a:r>
+              <a:rPr lang="en-US" smtClean="0">
+                <a:latin typeface="Calibri" charset="0"/>
+                <a:ea typeface="ＭＳ Ｐゴシック" charset="0"/>
+              </a:rPr>
+              <a:t>-</a:t>
+            </a:r>
+            <a:r>
               <a:rPr lang="en-US" dirty="0" smtClean="0">
                 <a:latin typeface="Calibri" charset="0"/>
                 <a:ea typeface="ＭＳ Ｐゴシック" charset="0"/>
               </a:rPr>
-              <a:t>2-vi. Pre</a:t>
+              <a:t>vi. Pre</a:t>
             </a:r>
             <a:r>
               <a:rPr lang="en-US" dirty="0">
@@ -6879,7 +6925,37 @@
                 <a:latin typeface="Calibri" charset="0"/>
                 <a:cs typeface="Segoe UI" charset="0"/>
               </a:rPr>
-              <a:t>Introduction to RNA sequencing (lecture)</a:t>
+              <a:t>Introduction to RNA sequencing </a:t>
+            </a:r>
+            <a:r>
+              <a:rPr lang="en-US" sz="2000" dirty="0" smtClean="0">
+                <a:solidFill>
+                  <a:schemeClr val="bg1"/>
+                </a:solidFill>
+                <a:latin typeface="Calibri" charset="0"/>
+                <a:cs typeface="Segoe UI" charset="0"/>
+              </a:rPr>
+              <a:t>(</a:t>
+            </a:r>
+            <a:r>
+              <a:rPr lang="en-US" sz="2000" dirty="0" smtClean="0">
+                <a:solidFill>
+                  <a:schemeClr val="bg1"/>
+                </a:solidFill>
+                <a:latin typeface="Calibri" charset="0"/>
+                <a:cs typeface="Segoe UI" charset="0"/>
+              </a:rPr>
+              <a:t>tutorial</a:t>
+            </a:r>
+            <a:r>
+              <a:rPr lang="en-US" sz="2000" dirty="0" smtClean="0">
+                <a:solidFill>
+                  <a:schemeClr val="bg1"/>
+                </a:solidFill>
+                <a:latin typeface="Calibri" charset="0"/>
+                <a:cs typeface="Segoe UI" charset="0"/>
+              </a:rPr>
+              <a:t>)</a:t>
             </a:r>
             <a:endParaRPr lang="en-US" sz="1800" b="1" dirty="0">
               <a:solidFill>
@@ -7948,12 +8024,28 @@
           <a:p>
             <a:pPr eaLnBrk="1" hangingPunct="1"/>
             <a:r>
+              <a:rPr lang="en-US" altLang="ko-KR" dirty="0">
+                <a:latin typeface="Calibri" charset="0"/>
+                <a:ea typeface="ＭＳ Ｐゴシック" charset="0"/>
+                <a:cs typeface="ＭＳ Ｐゴシック" charset="0"/>
+              </a:rPr>
+              <a:t>1</a:t>
+            </a:r>
+            <a:r>
               <a:rPr lang="en-US" altLang="ko-KR" dirty="0" smtClean="0">
                 <a:latin typeface="Calibri" charset="0"/>
                 <a:ea typeface="ＭＳ Ｐゴシック" charset="0"/>
                 <a:cs typeface="ＭＳ Ｐゴシック" charset="0"/>
               </a:rPr>
-              <a:t>2-i. Installation</a:t>
+              <a:t>-</a:t>
+            </a:r>
+            <a:r>
+              <a:rPr lang="en-US" altLang="ko-KR" dirty="0" smtClean="0">
+                <a:latin typeface="Calibri" charset="0"/>
+                <a:ea typeface="ＭＳ Ｐゴシック" charset="0"/>
+                <a:cs typeface="ＭＳ Ｐゴシック" charset="0"/>
+              </a:rPr>
+              <a:t>i. Installation</a:t>
             </a:r>
             <a:endParaRPr lang="en-US" altLang="ko-KR" dirty="0">
               <a:latin typeface="Calibri" charset="0"/>
@@ -8705,12 +8797,28 @@
           <a:p>
             <a:pPr eaLnBrk="1" hangingPunct="1"/>
             <a:r>
+              <a:rPr lang="en-US" altLang="ko-KR" dirty="0">
+                <a:latin typeface="Calibri" charset="0"/>
+                <a:ea typeface="ＭＳ Ｐゴシック" charset="0"/>
+                <a:cs typeface="ＭＳ Ｐゴシック" charset="0"/>
+              </a:rPr>
+              <a:t>1</a:t>
+            </a:r>
+            <a:r>
               <a:rPr lang="en-US" altLang="ko-KR" dirty="0" smtClean="0">
                 <a:latin typeface="Calibri" charset="0"/>
                 <a:ea typeface="ＭＳ Ｐゴシック" charset="0"/>
                 <a:cs typeface="ＭＳ Ｐゴシック" charset="0"/>
               </a:rPr>
-              <a:t>2-ii. Obtain </a:t>
+              <a:t>-</a:t>
+            </a:r>
+            <a:r>
+              <a:rPr lang="en-US" altLang="ko-KR" dirty="0" smtClean="0">
+                <a:latin typeface="Calibri" charset="0"/>
+                <a:ea typeface="ＭＳ Ｐゴシック" charset="0"/>
+                <a:cs typeface="ＭＳ Ｐゴシック" charset="0"/>
+              </a:rPr>
+              <a:t>ii. Obtain </a:t>
             </a:r>
             <a:r>
               <a:rPr lang="en-US" altLang="ko-KR" dirty="0">
@@ -8930,12 +9038,28 @@
           <a:p>
             <a:pPr eaLnBrk="1" hangingPunct="1"/>
             <a:r>
+              <a:rPr lang="en-US" altLang="ko-KR" sz="3600" dirty="0">
+                <a:latin typeface="Calibri" charset="0"/>
+                <a:ea typeface="ＭＳ Ｐゴシック" charset="0"/>
+                <a:cs typeface="ＭＳ Ｐゴシック" charset="0"/>
+              </a:rPr>
+              <a:t>1</a:t>
+            </a:r>
+            <a:r>
               <a:rPr lang="en-US" altLang="ko-KR" sz="3600" dirty="0" smtClean="0">
                 <a:latin typeface="Calibri" charset="0"/>
                 <a:ea typeface="ＭＳ Ｐゴシック" charset="0"/>
                 <a:cs typeface="ＭＳ Ｐゴシック" charset="0"/>
               </a:rPr>
-              <a:t>2-iii. Obtain </a:t>
+              <a:t>-</a:t>
+            </a:r>
+            <a:r>
+              <a:rPr lang="en-US" altLang="ko-KR" sz="3600" dirty="0" smtClean="0">
+                <a:latin typeface="Calibri" charset="0"/>
+                <a:ea typeface="ＭＳ Ｐゴシック" charset="0"/>
+                <a:cs typeface="ＭＳ Ｐゴシック" charset="0"/>
+              </a:rPr>
+              <a:t>iii. Obtain </a:t>
             </a:r>
             <a:r>
               <a:rPr lang="en-US" altLang="ko-KR" sz="3600" dirty="0">
@@ -9218,11 +9342,25 @@
           <a:lstStyle/>
           <a:p>
             <a:r>
+              <a:rPr lang="en-US" dirty="0">
+                <a:latin typeface="Calibri" charset="0"/>
+                <a:ea typeface="ＭＳ Ｐゴシック" charset="0"/>
+              </a:rPr>
+              <a:t>1</a:t>
+            </a:r>
+            <a:r>
               <a:rPr lang="en-US" dirty="0" smtClean="0">
                 <a:latin typeface="Calibri" charset="0"/>
                 <a:ea typeface="ＭＳ Ｐゴシック" charset="0"/>
               </a:rPr>
-              <a:t>2-iv. Create </a:t>
+              <a:t>-</a:t>
+            </a:r>
+            <a:r>
+              <a:rPr lang="en-US" dirty="0" smtClean="0">
+                <a:latin typeface="Calibri" charset="0"/>
+                <a:ea typeface="ＭＳ Ｐゴシック" charset="0"/>
+              </a:rPr>
+              <a:t>iv. Create </a:t>
             </a:r>
             <a:r>
               <a:rPr lang="en-US" dirty="0">

</xml_diff>